<commit_message>
final slide UI component
</commit_message>
<xml_diff>
--- a/Seminar/UI component tags.pptx
+++ b/Seminar/UI component tags.pptx
@@ -7,6 +7,16 @@
   <p:sldIdLst>
     <p:sldId id="256" r:id="rId2"/>
     <p:sldId id="257" r:id="rId3"/>
+    <p:sldId id="258" r:id="rId4"/>
+    <p:sldId id="259" r:id="rId5"/>
+    <p:sldId id="260" r:id="rId6"/>
+    <p:sldId id="261" r:id="rId7"/>
+    <p:sldId id="263" r:id="rId8"/>
+    <p:sldId id="262" r:id="rId9"/>
+    <p:sldId id="264" r:id="rId10"/>
+    <p:sldId id="265" r:id="rId11"/>
+    <p:sldId id="266" r:id="rId12"/>
+    <p:sldId id="267" r:id="rId13"/>
   </p:sldIdLst>
   <p:sldSz cx="12192000" cy="6858000"/>
   <p:notesSz cx="6858000" cy="9144000"/>
@@ -3034,6 +3044,292 @@
 </p:sld>
 </file>
 
+<file path=ppt/slides/slide10.xml><?xml version="1.0" encoding="utf-8"?>
+<p:sld xmlns:a="http://schemas.openxmlformats.org/drawingml/2006/main" xmlns:r="http://schemas.openxmlformats.org/officeDocument/2006/relationships" xmlns:p="http://schemas.openxmlformats.org/presentationml/2006/main">
+  <p:cSld>
+    <p:spTree>
+      <p:nvGrpSpPr>
+        <p:cNvPr id="1" name=""/>
+        <p:cNvGrpSpPr/>
+        <p:nvPr/>
+      </p:nvGrpSpPr>
+      <p:grpSpPr>
+        <a:xfrm>
+          <a:off x="0" y="0"/>
+          <a:ext cx="0" cy="0"/>
+          <a:chOff x="0" y="0"/>
+          <a:chExt cx="0" cy="0"/>
+        </a:xfrm>
+      </p:grpSpPr>
+      <p:sp>
+        <p:nvSpPr>
+          <p:cNvPr id="2" name="Title 1"/>
+          <p:cNvSpPr>
+            <a:spLocks noGrp="1"/>
+          </p:cNvSpPr>
+          <p:nvPr>
+            <p:ph type="title"/>
+          </p:nvPr>
+        </p:nvSpPr>
+        <p:spPr/>
+        <p:txBody>
+          <a:bodyPr/>
+          <a:lstStyle/>
+          <a:p>
+            <a:r>
+              <a:rPr lang="en-US"/>
+              <a:t>Theme</a:t>
+            </a:r>
+            <a:endParaRPr lang="vi-VN"/>
+          </a:p>
+        </p:txBody>
+      </p:sp>
+      <p:pic>
+        <p:nvPicPr>
+          <p:cNvPr id="5" name="Content Placeholder 4"/>
+          <p:cNvPicPr>
+            <a:picLocks noGrp="1" noChangeAspect="1"/>
+          </p:cNvPicPr>
+          <p:nvPr>
+            <p:ph idx="1"/>
+          </p:nvPr>
+        </p:nvPicPr>
+        <p:blipFill>
+          <a:blip r:embed="rId2">
+            <a:extLst>
+              <a:ext uri="{28A0092B-C50C-407E-A947-70E740481C1C}">
+                <a14:useLocalDpi xmlns:a14="http://schemas.microsoft.com/office/drawing/2010/main" val="0"/>
+              </a:ext>
+            </a:extLst>
+          </a:blip>
+          <a:stretch>
+            <a:fillRect/>
+          </a:stretch>
+        </p:blipFill>
+        <p:spPr>
+          <a:xfrm>
+            <a:off x="838200" y="1690688"/>
+            <a:ext cx="6439799" cy="1114581"/>
+          </a:xfrm>
+        </p:spPr>
+      </p:pic>
+      <p:pic>
+        <p:nvPicPr>
+          <p:cNvPr id="8" name="Picture 7"/>
+          <p:cNvPicPr>
+            <a:picLocks noChangeAspect="1"/>
+          </p:cNvPicPr>
+          <p:nvPr/>
+        </p:nvPicPr>
+        <p:blipFill>
+          <a:blip r:embed="rId3">
+            <a:extLst>
+              <a:ext uri="{28A0092B-C50C-407E-A947-70E740481C1C}">
+                <a14:useLocalDpi xmlns:a14="http://schemas.microsoft.com/office/drawing/2010/main" val="0"/>
+              </a:ext>
+            </a:extLst>
+          </a:blip>
+          <a:stretch>
+            <a:fillRect/>
+          </a:stretch>
+        </p:blipFill>
+        <p:spPr>
+          <a:xfrm>
+            <a:off x="814384" y="2805269"/>
+            <a:ext cx="6487430" cy="1438476"/>
+          </a:xfrm>
+          <a:prstGeom prst="rect">
+            <a:avLst/>
+          </a:prstGeom>
+        </p:spPr>
+      </p:pic>
+    </p:spTree>
+    <p:extLst>
+      <p:ext uri="{BB962C8B-B14F-4D97-AF65-F5344CB8AC3E}">
+        <p14:creationId xmlns:p14="http://schemas.microsoft.com/office/powerpoint/2010/main" val="2885837211"/>
+      </p:ext>
+    </p:extLst>
+  </p:cSld>
+  <p:clrMapOvr>
+    <a:masterClrMapping/>
+  </p:clrMapOvr>
+</p:sld>
+</file>
+
+<file path=ppt/slides/slide11.xml><?xml version="1.0" encoding="utf-8"?>
+<p:sld xmlns:a="http://schemas.openxmlformats.org/drawingml/2006/main" xmlns:r="http://schemas.openxmlformats.org/officeDocument/2006/relationships" xmlns:p="http://schemas.openxmlformats.org/presentationml/2006/main">
+  <p:cSld>
+    <p:spTree>
+      <p:nvGrpSpPr>
+        <p:cNvPr id="1" name=""/>
+        <p:cNvGrpSpPr/>
+        <p:nvPr/>
+      </p:nvGrpSpPr>
+      <p:grpSpPr>
+        <a:xfrm>
+          <a:off x="0" y="0"/>
+          <a:ext cx="0" cy="0"/>
+          <a:chOff x="0" y="0"/>
+          <a:chExt cx="0" cy="0"/>
+        </a:xfrm>
+      </p:grpSpPr>
+      <p:sp>
+        <p:nvSpPr>
+          <p:cNvPr id="2" name="Title 1"/>
+          <p:cNvSpPr>
+            <a:spLocks noGrp="1"/>
+          </p:cNvSpPr>
+          <p:nvPr>
+            <p:ph type="title"/>
+          </p:nvPr>
+        </p:nvSpPr>
+        <p:spPr/>
+        <p:txBody>
+          <a:bodyPr/>
+          <a:lstStyle/>
+          <a:p>
+            <a:r>
+              <a:rPr lang="vi-VN" b="1" i="1"/>
+              <a:t>Common attributes</a:t>
+            </a:r>
+            <a:r>
+              <a:rPr lang="vi-VN"/>
+              <a:t> </a:t>
+            </a:r>
+            <a:br>
+              <a:rPr lang="vi-VN"/>
+            </a:br>
+            <a:endParaRPr lang="vi-VN"/>
+          </a:p>
+        </p:txBody>
+      </p:sp>
+      <p:pic>
+        <p:nvPicPr>
+          <p:cNvPr id="4" name="Content Placeholder 3"/>
+          <p:cNvPicPr>
+            <a:picLocks noGrp="1" noChangeAspect="1"/>
+          </p:cNvPicPr>
+          <p:nvPr>
+            <p:ph idx="1"/>
+          </p:nvPr>
+        </p:nvPicPr>
+        <p:blipFill>
+          <a:blip r:embed="rId2">
+            <a:extLst>
+              <a:ext uri="{28A0092B-C50C-407E-A947-70E740481C1C}">
+                <a14:useLocalDpi xmlns:a14="http://schemas.microsoft.com/office/drawing/2010/main" val="0"/>
+              </a:ext>
+            </a:extLst>
+          </a:blip>
+          <a:stretch>
+            <a:fillRect/>
+          </a:stretch>
+        </p:blipFill>
+        <p:spPr>
+          <a:xfrm>
+            <a:off x="838200" y="1487606"/>
+            <a:ext cx="10515600" cy="4689357"/>
+          </a:xfrm>
+          <a:prstGeom prst="rect">
+            <a:avLst/>
+          </a:prstGeom>
+        </p:spPr>
+      </p:pic>
+    </p:spTree>
+    <p:extLst>
+      <p:ext uri="{BB962C8B-B14F-4D97-AF65-F5344CB8AC3E}">
+        <p14:creationId xmlns:p14="http://schemas.microsoft.com/office/powerpoint/2010/main" val="1453169250"/>
+      </p:ext>
+    </p:extLst>
+  </p:cSld>
+  <p:clrMapOvr>
+    <a:masterClrMapping/>
+  </p:clrMapOvr>
+</p:sld>
+</file>
+
+<file path=ppt/slides/slide12.xml><?xml version="1.0" encoding="utf-8"?>
+<p:sld xmlns:a="http://schemas.openxmlformats.org/drawingml/2006/main" xmlns:r="http://schemas.openxmlformats.org/officeDocument/2006/relationships" xmlns:p="http://schemas.openxmlformats.org/presentationml/2006/main">
+  <p:cSld>
+    <p:spTree>
+      <p:nvGrpSpPr>
+        <p:cNvPr id="1" name=""/>
+        <p:cNvGrpSpPr/>
+        <p:nvPr/>
+      </p:nvGrpSpPr>
+      <p:grpSpPr>
+        <a:xfrm>
+          <a:off x="0" y="0"/>
+          <a:ext cx="0" cy="0"/>
+          <a:chOff x="0" y="0"/>
+          <a:chExt cx="0" cy="0"/>
+        </a:xfrm>
+      </p:grpSpPr>
+      <p:sp>
+        <p:nvSpPr>
+          <p:cNvPr id="2" name="Title 1"/>
+          <p:cNvSpPr>
+            <a:spLocks noGrp="1"/>
+          </p:cNvSpPr>
+          <p:nvPr>
+            <p:ph type="title"/>
+          </p:nvPr>
+        </p:nvSpPr>
+        <p:spPr/>
+        <p:txBody>
+          <a:bodyPr/>
+          <a:lstStyle/>
+          <a:p>
+            <a:r>
+              <a:rPr lang="vi-VN" b="1" i="1"/>
+              <a:t>Common attributes</a:t>
+            </a:r>
+            <a:endParaRPr lang="vi-VN"/>
+          </a:p>
+        </p:txBody>
+      </p:sp>
+      <p:pic>
+        <p:nvPicPr>
+          <p:cNvPr id="6" name="Content Placeholder 5"/>
+          <p:cNvPicPr>
+            <a:picLocks noGrp="1" noChangeAspect="1"/>
+          </p:cNvPicPr>
+          <p:nvPr>
+            <p:ph idx="1"/>
+          </p:nvPr>
+        </p:nvPicPr>
+        <p:blipFill>
+          <a:blip r:embed="rId2">
+            <a:extLst>
+              <a:ext uri="{28A0092B-C50C-407E-A947-70E740481C1C}">
+                <a14:useLocalDpi xmlns:a14="http://schemas.microsoft.com/office/drawing/2010/main" val="0"/>
+              </a:ext>
+            </a:extLst>
+          </a:blip>
+          <a:stretch>
+            <a:fillRect/>
+          </a:stretch>
+        </p:blipFill>
+        <p:spPr>
+          <a:xfrm>
+            <a:off x="838200" y="1801504"/>
+            <a:ext cx="8773015" cy="3647792"/>
+          </a:xfrm>
+        </p:spPr>
+      </p:pic>
+    </p:spTree>
+    <p:extLst>
+      <p:ext uri="{BB962C8B-B14F-4D97-AF65-F5344CB8AC3E}">
+        <p14:creationId xmlns:p14="http://schemas.microsoft.com/office/powerpoint/2010/main" val="3319094489"/>
+      </p:ext>
+    </p:extLst>
+  </p:cSld>
+  <p:clrMapOvr>
+    <a:masterClrMapping/>
+  </p:clrMapOvr>
+</p:sld>
+</file>
+
 <file path=ppt/slides/slide2.xml><?xml version="1.0" encoding="utf-8"?>
 <p:sld xmlns:a="http://schemas.openxmlformats.org/drawingml/2006/main" xmlns:r="http://schemas.openxmlformats.org/officeDocument/2006/relationships" xmlns:p="http://schemas.openxmlformats.org/presentationml/2006/main">
   <p:cSld>
@@ -3087,183 +3383,98 @@
         <p:spPr>
           <a:xfrm>
             <a:off x="838200" y="1575582"/>
-            <a:ext cx="10515600" cy="4601381"/>
+            <a:ext cx="10515600" cy="4895555"/>
           </a:xfrm>
         </p:spPr>
         <p:txBody>
-          <a:bodyPr>
-            <a:normAutofit fontScale="40000" lnSpcReduction="20000"/>
+          <a:bodyPr anchor="ctr">
+            <a:normAutofit fontScale="47500" lnSpcReduction="20000"/>
           </a:bodyPr>
           <a:lstStyle/>
           <a:p>
             <a:r>
-              <a:rPr lang="en-US" b="1" i="1"/>
+              <a:rPr lang="en-US" sz="5100" b="1" i="1"/>
               <a:t>Why we need UI component tags</a:t>
             </a:r>
             <a:r>
-              <a:rPr lang="en-US"/>
+              <a:rPr lang="en-US" sz="4400"/>
               <a:t> </a:t>
             </a:r>
           </a:p>
           <a:p>
             <a:pPr lvl="1"/>
             <a:r>
-              <a:rPr lang="en-US" b="1" i="1"/>
+              <a:rPr lang="en-US" sz="5100" b="1" i="1"/>
               <a:t>More than just form elements</a:t>
             </a:r>
             <a:r>
-              <a:rPr lang="en-US"/>
+              <a:rPr lang="en-US" sz="5100"/>
               <a:t> </a:t>
             </a:r>
           </a:p>
           <a:p>
             <a:pPr lvl="2"/>
             <a:r>
-              <a:rPr lang="vi-VN" i="1"/>
+              <a:rPr lang="vi-VN" sz="3800" i="1"/>
               <a:t>GENERATING THE HTML MARKUP </a:t>
             </a:r>
           </a:p>
           <a:p>
             <a:pPr lvl="2"/>
             <a:r>
-              <a:rPr lang="en-US" i="1"/>
+              <a:rPr lang="en-US" sz="3800" i="1"/>
               <a:t>BINDING FORM FIELDS TO VALUESTACK PROPERTIES</a:t>
             </a:r>
           </a:p>
           <a:p>
             <a:pPr lvl="2"/>
             <a:r>
-              <a:rPr lang="en-US" i="1"/>
+              <a:rPr lang="en-US" sz="3800" i="1"/>
               <a:t>INTEGRATION WITH TYPE CONVERSION, VALIDATION, AND INTERNATIONALIZATION </a:t>
             </a:r>
           </a:p>
           <a:p>
             <a:r>
-              <a:rPr lang="vi-VN" b="1" i="1"/>
+              <a:rPr lang="vi-VN" sz="5100" b="1" i="1"/>
               <a:t>Tags, templates, and themes</a:t>
             </a:r>
             <a:r>
-              <a:rPr lang="vi-VN"/>
+              <a:rPr lang="vi-VN" sz="5100"/>
               <a:t> </a:t>
             </a:r>
           </a:p>
           <a:p>
             <a:pPr lvl="1"/>
             <a:r>
-              <a:rPr lang="vi-VN" b="1"/>
+              <a:rPr lang="vi-VN" sz="5100" b="1"/>
               <a:t>Tags</a:t>
             </a:r>
           </a:p>
           <a:p>
             <a:pPr lvl="1"/>
             <a:r>
-              <a:rPr lang="vi-VN" b="1"/>
+              <a:rPr lang="vi-VN" sz="5100" b="1"/>
               <a:t>Teamplates</a:t>
             </a:r>
           </a:p>
           <a:p>
             <a:pPr lvl="1"/>
             <a:r>
-              <a:rPr lang="vi-VN" b="1"/>
+              <a:rPr lang="vi-VN" sz="5100" b="1"/>
               <a:t>Themes</a:t>
             </a:r>
           </a:p>
           <a:p>
             <a:pPr lvl="2"/>
             <a:r>
-              <a:rPr lang="vi-VN" i="1"/>
+              <a:rPr lang="vi-VN" sz="5100" i="1"/>
               <a:t>CHANGING THE THEME</a:t>
             </a:r>
           </a:p>
           <a:p>
-            <a:r>
-              <a:rPr lang="vi-VN" b="1" i="1"/>
-              <a:t>UI Component tag reference</a:t>
-            </a:r>
-          </a:p>
-          <a:p>
-            <a:pPr lvl="1"/>
-            <a:r>
-              <a:rPr lang="vi-VN" b="1" i="1"/>
-              <a:t>Common attributes</a:t>
-            </a:r>
-            <a:r>
-              <a:rPr lang="vi-VN"/>
-              <a:t> </a:t>
-            </a:r>
-          </a:p>
-          <a:p>
-            <a:pPr lvl="1"/>
-            <a:r>
-              <a:rPr lang="vi-VN" b="1" i="1"/>
-              <a:t>Simple components</a:t>
-            </a:r>
-          </a:p>
-          <a:p>
-            <a:pPr lvl="2"/>
-            <a:r>
-              <a:rPr lang="vi-VN"/>
-              <a:t>THE HEAD COMPONENT </a:t>
-            </a:r>
-          </a:p>
-          <a:p>
-            <a:pPr lvl="2"/>
-            <a:r>
-              <a:rPr lang="vi-VN"/>
-              <a:t>THE FORM COMPONENT</a:t>
-            </a:r>
-          </a:p>
-          <a:p>
-            <a:pPr lvl="2"/>
-            <a:r>
-              <a:rPr lang="vi-VN"/>
-              <a:t>THE TEXTFIELD COMPONENT </a:t>
-            </a:r>
-          </a:p>
-          <a:p>
-            <a:pPr lvl="2"/>
-            <a:r>
-              <a:rPr lang="vi-VN"/>
-              <a:t>THE PASSWORD COMPONENT</a:t>
-            </a:r>
-          </a:p>
-          <a:p>
-            <a:pPr lvl="2"/>
-            <a:r>
-              <a:rPr lang="vi-VN"/>
-              <a:t>THE TEXTAREA COMPONENT</a:t>
-            </a:r>
-          </a:p>
-          <a:p>
-            <a:pPr lvl="2"/>
-            <a:r>
-              <a:rPr lang="vi-VN"/>
-              <a:t> THE CHECKBOX COMPONENT</a:t>
-            </a:r>
-          </a:p>
-          <a:p>
-            <a:pPr lvl="1"/>
-            <a:r>
-              <a:rPr lang="vi-VN" b="1" i="1"/>
-              <a:t>Collection-backed components</a:t>
-            </a:r>
-            <a:r>
-              <a:rPr lang="vi-VN"/>
-              <a:t> </a:t>
-            </a:r>
-            <a:br>
-              <a:rPr lang="vi-VN"/>
-            </a:br>
-            <a:r>
-              <a:rPr lang="vi-VN"/>
-              <a:t> </a:t>
-            </a:r>
-            <a:br>
-              <a:rPr lang="vi-VN"/>
-            </a:br>
-            <a:br>
-              <a:rPr lang="vi-VN"/>
-            </a:br>
+            <a:pPr marL="0" indent="0">
+              <a:buNone/>
+            </a:pPr>
             <a:br>
               <a:rPr lang="vi-VN"/>
             </a:br>
@@ -3297,6 +3508,1031 @@
     <p:extLst>
       <p:ext uri="{BB962C8B-B14F-4D97-AF65-F5344CB8AC3E}">
         <p14:creationId xmlns:p14="http://schemas.microsoft.com/office/powerpoint/2010/main" val="1279677780"/>
+      </p:ext>
+    </p:extLst>
+  </p:cSld>
+  <p:clrMapOvr>
+    <a:masterClrMapping/>
+  </p:clrMapOvr>
+</p:sld>
+</file>
+
+<file path=ppt/slides/slide3.xml><?xml version="1.0" encoding="utf-8"?>
+<p:sld xmlns:a="http://schemas.openxmlformats.org/drawingml/2006/main" xmlns:r="http://schemas.openxmlformats.org/officeDocument/2006/relationships" xmlns:p="http://schemas.openxmlformats.org/presentationml/2006/main">
+  <p:cSld>
+    <p:spTree>
+      <p:nvGrpSpPr>
+        <p:cNvPr id="1" name=""/>
+        <p:cNvGrpSpPr/>
+        <p:nvPr/>
+      </p:nvGrpSpPr>
+      <p:grpSpPr>
+        <a:xfrm>
+          <a:off x="0" y="0"/>
+          <a:ext cx="0" cy="0"/>
+          <a:chOff x="0" y="0"/>
+          <a:chExt cx="0" cy="0"/>
+        </a:xfrm>
+      </p:grpSpPr>
+      <p:sp>
+        <p:nvSpPr>
+          <p:cNvPr id="2" name="Title 1"/>
+          <p:cNvSpPr>
+            <a:spLocks noGrp="1"/>
+          </p:cNvSpPr>
+          <p:nvPr>
+            <p:ph type="title"/>
+          </p:nvPr>
+        </p:nvSpPr>
+        <p:spPr/>
+        <p:txBody>
+          <a:bodyPr/>
+          <a:lstStyle/>
+          <a:p>
+            <a:r>
+              <a:rPr lang="vi-VN" i="1"/>
+              <a:t>UI component tags</a:t>
+            </a:r>
+            <a:endParaRPr lang="vi-VN"/>
+          </a:p>
+        </p:txBody>
+      </p:sp>
+      <p:sp>
+        <p:nvSpPr>
+          <p:cNvPr id="3" name="Content Placeholder 2"/>
+          <p:cNvSpPr>
+            <a:spLocks noGrp="1"/>
+          </p:cNvSpPr>
+          <p:nvPr>
+            <p:ph idx="1"/>
+          </p:nvPr>
+        </p:nvSpPr>
+        <p:spPr/>
+        <p:txBody>
+          <a:bodyPr>
+            <a:normAutofit fontScale="85000" lnSpcReduction="20000"/>
+          </a:bodyPr>
+          <a:lstStyle/>
+          <a:p>
+            <a:r>
+              <a:rPr lang="vi-VN" b="1" i="1"/>
+              <a:t>UI Component tag reference</a:t>
+            </a:r>
+          </a:p>
+          <a:p>
+            <a:pPr lvl="1"/>
+            <a:r>
+              <a:rPr lang="vi-VN" b="1" i="1"/>
+              <a:t>Common attributes</a:t>
+            </a:r>
+            <a:r>
+              <a:rPr lang="vi-VN"/>
+              <a:t> </a:t>
+            </a:r>
+          </a:p>
+          <a:p>
+            <a:pPr lvl="1"/>
+            <a:r>
+              <a:rPr lang="vi-VN" b="1" i="1"/>
+              <a:t>Simple components</a:t>
+            </a:r>
+          </a:p>
+          <a:p>
+            <a:pPr lvl="2"/>
+            <a:r>
+              <a:rPr lang="vi-VN"/>
+              <a:t>THE HEAD COMPONENT </a:t>
+            </a:r>
+          </a:p>
+          <a:p>
+            <a:pPr lvl="2"/>
+            <a:r>
+              <a:rPr lang="vi-VN"/>
+              <a:t>THE FORM COMPONENT</a:t>
+            </a:r>
+          </a:p>
+          <a:p>
+            <a:pPr lvl="2"/>
+            <a:r>
+              <a:rPr lang="vi-VN"/>
+              <a:t>THE TEXTFIELD COMPONENT </a:t>
+            </a:r>
+          </a:p>
+          <a:p>
+            <a:pPr lvl="2"/>
+            <a:r>
+              <a:rPr lang="vi-VN"/>
+              <a:t>THE PASSWORD COMPONENT</a:t>
+            </a:r>
+          </a:p>
+          <a:p>
+            <a:pPr lvl="2"/>
+            <a:r>
+              <a:rPr lang="vi-VN"/>
+              <a:t>THE TEXTAREA COMPONENT</a:t>
+            </a:r>
+          </a:p>
+          <a:p>
+            <a:pPr lvl="2"/>
+            <a:r>
+              <a:rPr lang="vi-VN"/>
+              <a:t> THE CHECKBOX COMPONENT</a:t>
+            </a:r>
+          </a:p>
+          <a:p>
+            <a:pPr lvl="1"/>
+            <a:r>
+              <a:rPr lang="vi-VN" b="1" i="1"/>
+              <a:t>Collection-backed components</a:t>
+            </a:r>
+          </a:p>
+          <a:p>
+            <a:pPr lvl="2"/>
+            <a:r>
+              <a:rPr lang="vi-VN"/>
+              <a:t>THE SELECT COMPONENT </a:t>
+            </a:r>
+          </a:p>
+          <a:p>
+            <a:pPr lvl="2"/>
+            <a:r>
+              <a:rPr lang="vi-VN"/>
+              <a:t>THE RADIO COMPONENT</a:t>
+            </a:r>
+          </a:p>
+          <a:p>
+            <a:pPr lvl="2"/>
+            <a:r>
+              <a:rPr lang="vi-VN"/>
+              <a:t>THE CHECKBOXLIST COMPONENT</a:t>
+            </a:r>
+          </a:p>
+          <a:p>
+            <a:pPr lvl="2"/>
+            <a:r>
+              <a:rPr lang="vi-VN"/>
+              <a:t>PREPOPULATION WITH COLLECTION-BACKED COMPONENTS </a:t>
+            </a:r>
+            <a:br>
+              <a:rPr lang="vi-VN"/>
+            </a:br>
+            <a:br>
+              <a:rPr lang="vi-VN"/>
+            </a:br>
+            <a:br>
+              <a:rPr lang="vi-VN"/>
+            </a:br>
+            <a:endParaRPr lang="vi-VN"/>
+          </a:p>
+        </p:txBody>
+      </p:sp>
+    </p:spTree>
+    <p:extLst>
+      <p:ext uri="{BB962C8B-B14F-4D97-AF65-F5344CB8AC3E}">
+        <p14:creationId xmlns:p14="http://schemas.microsoft.com/office/powerpoint/2010/main" val="2152101931"/>
+      </p:ext>
+    </p:extLst>
+  </p:cSld>
+  <p:clrMapOvr>
+    <a:masterClrMapping/>
+  </p:clrMapOvr>
+</p:sld>
+</file>
+
+<file path=ppt/slides/slide4.xml><?xml version="1.0" encoding="utf-8"?>
+<p:sld xmlns:a="http://schemas.openxmlformats.org/drawingml/2006/main" xmlns:r="http://schemas.openxmlformats.org/officeDocument/2006/relationships" xmlns:p="http://schemas.openxmlformats.org/presentationml/2006/main">
+  <p:cSld>
+    <p:spTree>
+      <p:nvGrpSpPr>
+        <p:cNvPr id="1" name=""/>
+        <p:cNvGrpSpPr/>
+        <p:nvPr/>
+      </p:nvGrpSpPr>
+      <p:grpSpPr>
+        <a:xfrm>
+          <a:off x="0" y="0"/>
+          <a:ext cx="0" cy="0"/>
+          <a:chOff x="0" y="0"/>
+          <a:chExt cx="0" cy="0"/>
+        </a:xfrm>
+      </p:grpSpPr>
+      <p:sp>
+        <p:nvSpPr>
+          <p:cNvPr id="2" name="Title 1"/>
+          <p:cNvSpPr>
+            <a:spLocks noGrp="1"/>
+          </p:cNvSpPr>
+          <p:nvPr>
+            <p:ph type="title"/>
+          </p:nvPr>
+        </p:nvSpPr>
+        <p:spPr/>
+        <p:txBody>
+          <a:bodyPr/>
+          <a:lstStyle/>
+          <a:p>
+            <a:r>
+              <a:rPr lang="vi-VN" i="1"/>
+              <a:t>UI component tags</a:t>
+            </a:r>
+            <a:endParaRPr lang="vi-VN"/>
+          </a:p>
+        </p:txBody>
+      </p:sp>
+      <p:sp>
+        <p:nvSpPr>
+          <p:cNvPr id="3" name="Content Placeholder 2"/>
+          <p:cNvSpPr>
+            <a:spLocks noGrp="1"/>
+          </p:cNvSpPr>
+          <p:nvPr>
+            <p:ph idx="1"/>
+          </p:nvPr>
+        </p:nvSpPr>
+        <p:spPr/>
+        <p:txBody>
+          <a:bodyPr/>
+          <a:lstStyle/>
+          <a:p>
+            <a:r>
+              <a:rPr lang="vi-VN" b="1" i="1"/>
+              <a:t>Bonus components</a:t>
+            </a:r>
+            <a:r>
+              <a:rPr lang="vi-VN"/>
+              <a:t> </a:t>
+            </a:r>
+          </a:p>
+          <a:p>
+            <a:pPr lvl="1"/>
+            <a:r>
+              <a:rPr lang="vi-VN"/>
+              <a:t>THE LABEL COMPONENT</a:t>
+            </a:r>
+          </a:p>
+          <a:p>
+            <a:pPr lvl="1"/>
+            <a:r>
+              <a:rPr lang="vi-VN"/>
+              <a:t>THE HIDDEN COMPONENT</a:t>
+            </a:r>
+          </a:p>
+          <a:p>
+            <a:pPr lvl="1"/>
+            <a:r>
+              <a:rPr lang="vi-VN"/>
+              <a:t>THE DOUBLESELECT COMPONENT </a:t>
+            </a:r>
+          </a:p>
+          <a:p>
+            <a:r>
+              <a:rPr lang="vi-VN" b="1" i="1"/>
+              <a:t>Summary</a:t>
+            </a:r>
+            <a:r>
+              <a:rPr lang="vi-VN"/>
+              <a:t> </a:t>
+            </a:r>
+            <a:br>
+              <a:rPr lang="vi-VN"/>
+            </a:br>
+            <a:r>
+              <a:rPr lang="vi-VN"/>
+              <a:t> </a:t>
+            </a:r>
+            <a:br>
+              <a:rPr lang="vi-VN"/>
+            </a:br>
+            <a:br>
+              <a:rPr lang="vi-VN"/>
+            </a:br>
+            <a:br>
+              <a:rPr lang="vi-VN"/>
+            </a:br>
+            <a:endParaRPr lang="vi-VN"/>
+          </a:p>
+        </p:txBody>
+      </p:sp>
+    </p:spTree>
+    <p:extLst>
+      <p:ext uri="{BB962C8B-B14F-4D97-AF65-F5344CB8AC3E}">
+        <p14:creationId xmlns:p14="http://schemas.microsoft.com/office/powerpoint/2010/main" val="3364820210"/>
+      </p:ext>
+    </p:extLst>
+  </p:cSld>
+  <p:clrMapOvr>
+    <a:masterClrMapping/>
+  </p:clrMapOvr>
+</p:sld>
+</file>
+
+<file path=ppt/slides/slide5.xml><?xml version="1.0" encoding="utf-8"?>
+<p:sld xmlns:a="http://schemas.openxmlformats.org/drawingml/2006/main" xmlns:r="http://schemas.openxmlformats.org/officeDocument/2006/relationships" xmlns:p="http://schemas.openxmlformats.org/presentationml/2006/main">
+  <p:cSld>
+    <p:spTree>
+      <p:nvGrpSpPr>
+        <p:cNvPr id="1" name=""/>
+        <p:cNvGrpSpPr/>
+        <p:nvPr/>
+      </p:nvGrpSpPr>
+      <p:grpSpPr>
+        <a:xfrm>
+          <a:off x="0" y="0"/>
+          <a:ext cx="0" cy="0"/>
+          <a:chOff x="0" y="0"/>
+          <a:chExt cx="0" cy="0"/>
+        </a:xfrm>
+      </p:grpSpPr>
+      <p:sp>
+        <p:nvSpPr>
+          <p:cNvPr id="2" name="Title 1"/>
+          <p:cNvSpPr>
+            <a:spLocks noGrp="1"/>
+          </p:cNvSpPr>
+          <p:nvPr>
+            <p:ph type="title"/>
+          </p:nvPr>
+        </p:nvSpPr>
+        <p:spPr/>
+        <p:txBody>
+          <a:bodyPr/>
+          <a:lstStyle/>
+          <a:p>
+            <a:r>
+              <a:rPr lang="en-US" b="1" i="1"/>
+              <a:t>Why we need UI component tags</a:t>
+            </a:r>
+            <a:r>
+              <a:rPr lang="en-US" sz="3600"/>
+              <a:t> </a:t>
+            </a:r>
+          </a:p>
+        </p:txBody>
+      </p:sp>
+      <p:sp>
+        <p:nvSpPr>
+          <p:cNvPr id="3" name="Content Placeholder 2"/>
+          <p:cNvSpPr>
+            <a:spLocks noGrp="1"/>
+          </p:cNvSpPr>
+          <p:nvPr>
+            <p:ph idx="1"/>
+          </p:nvPr>
+        </p:nvSpPr>
+        <p:spPr/>
+        <p:txBody>
+          <a:bodyPr/>
+          <a:lstStyle/>
+          <a:p>
+            <a:pPr marL="0" indent="0">
+              <a:buNone/>
+            </a:pPr>
+            <a:r>
+              <a:rPr lang="vi-VN"/>
+              <a:t>■ Generate HTML markup</a:t>
+            </a:r>
+            <a:br>
+              <a:rPr lang="vi-VN"/>
+            </a:br>
+            <a:r>
+              <a:rPr lang="vi-VN"/>
+              <a:t>■ Bind HTML form fields to Java-side properties</a:t>
+            </a:r>
+            <a:br>
+              <a:rPr lang="vi-VN"/>
+            </a:br>
+            <a:r>
+              <a:rPr lang="vi-VN"/>
+              <a:t>■ Tie into framework type conversion</a:t>
+            </a:r>
+            <a:br>
+              <a:rPr lang="vi-VN"/>
+            </a:br>
+            <a:r>
+              <a:rPr lang="vi-VN"/>
+              <a:t>■ Tie into framework validation</a:t>
+            </a:r>
+            <a:br>
+              <a:rPr lang="vi-VN"/>
+            </a:br>
+            <a:r>
+              <a:rPr lang="vi-VN"/>
+              <a:t>■ Tie into framework internationalization </a:t>
+            </a:r>
+            <a:br>
+              <a:rPr lang="vi-VN"/>
+            </a:br>
+            <a:endParaRPr lang="vi-VN"/>
+          </a:p>
+        </p:txBody>
+      </p:sp>
+    </p:spTree>
+    <p:extLst>
+      <p:ext uri="{BB962C8B-B14F-4D97-AF65-F5344CB8AC3E}">
+        <p14:creationId xmlns:p14="http://schemas.microsoft.com/office/powerpoint/2010/main" val="2560461045"/>
+      </p:ext>
+    </p:extLst>
+  </p:cSld>
+  <p:clrMapOvr>
+    <a:masterClrMapping/>
+  </p:clrMapOvr>
+</p:sld>
+</file>
+
+<file path=ppt/slides/slide6.xml><?xml version="1.0" encoding="utf-8"?>
+<p:sld xmlns:a="http://schemas.openxmlformats.org/drawingml/2006/main" xmlns:r="http://schemas.openxmlformats.org/officeDocument/2006/relationships" xmlns:p="http://schemas.openxmlformats.org/presentationml/2006/main">
+  <p:cSld>
+    <p:spTree>
+      <p:nvGrpSpPr>
+        <p:cNvPr id="1" name=""/>
+        <p:cNvGrpSpPr/>
+        <p:nvPr/>
+      </p:nvGrpSpPr>
+      <p:grpSpPr>
+        <a:xfrm>
+          <a:off x="0" y="0"/>
+          <a:ext cx="0" cy="0"/>
+          <a:chOff x="0" y="0"/>
+          <a:chExt cx="0" cy="0"/>
+        </a:xfrm>
+      </p:grpSpPr>
+      <p:sp>
+        <p:nvSpPr>
+          <p:cNvPr id="2" name="Title 1"/>
+          <p:cNvSpPr>
+            <a:spLocks noGrp="1"/>
+          </p:cNvSpPr>
+          <p:nvPr>
+            <p:ph type="title"/>
+          </p:nvPr>
+        </p:nvSpPr>
+        <p:spPr/>
+        <p:txBody>
+          <a:bodyPr/>
+          <a:lstStyle/>
+          <a:p>
+            <a:r>
+              <a:rPr lang="en-US" b="1" i="1"/>
+              <a:t>Why we need UI component tags</a:t>
+            </a:r>
+            <a:r>
+              <a:rPr lang="en-US" sz="3600"/>
+              <a:t> </a:t>
+            </a:r>
+            <a:endParaRPr lang="vi-VN"/>
+          </a:p>
+        </p:txBody>
+      </p:sp>
+      <p:sp>
+        <p:nvSpPr>
+          <p:cNvPr id="3" name="Content Placeholder 2"/>
+          <p:cNvSpPr>
+            <a:spLocks noGrp="1"/>
+          </p:cNvSpPr>
+          <p:nvPr>
+            <p:ph idx="1"/>
+          </p:nvPr>
+        </p:nvSpPr>
+        <p:spPr/>
+        <p:txBody>
+          <a:bodyPr>
+            <a:normAutofit fontScale="92500" lnSpcReduction="10000"/>
+          </a:bodyPr>
+          <a:lstStyle/>
+          <a:p>
+            <a:r>
+              <a:rPr lang="vi-VN" i="1"/>
+              <a:t>GENERATING THE HTML MARKUP </a:t>
+            </a:r>
+            <a:endParaRPr lang="vi-VN"/>
+          </a:p>
+          <a:p>
+            <a:pPr lvl="1"/>
+            <a:r>
+              <a:rPr lang="vi-VN"/>
+              <a:t>Struts 2</a:t>
+            </a:r>
+          </a:p>
+          <a:p>
+            <a:pPr marL="457200" lvl="1" indent="0">
+              <a:buNone/>
+            </a:pPr>
+            <a:r>
+              <a:rPr lang="vi-VN"/>
+              <a:t>&lt;s:textfield name="username" label="Username"/&gt; </a:t>
+            </a:r>
+          </a:p>
+          <a:p>
+            <a:pPr lvl="1"/>
+            <a:r>
+              <a:rPr lang="vi-VN"/>
+              <a:t>HTML</a:t>
+            </a:r>
+          </a:p>
+          <a:p>
+            <a:pPr marL="457200" lvl="1" indent="0">
+              <a:buNone/>
+            </a:pPr>
+            <a:r>
+              <a:rPr lang="vi-VN"/>
+              <a:t>&lt;td class="tdLabel"&gt;</a:t>
+            </a:r>
+            <a:br>
+              <a:rPr lang="vi-VN"/>
+            </a:br>
+            <a:r>
+              <a:rPr lang="vi-VN"/>
+              <a:t>	&lt;label for="Register_username" 						class="label"&gt;Username:&lt;/label&gt;</a:t>
+            </a:r>
+            <a:br>
+              <a:rPr lang="vi-VN"/>
+            </a:br>
+            <a:r>
+              <a:rPr lang="vi-VN"/>
+              <a:t>&lt;/td&gt;</a:t>
+            </a:r>
+            <a:br>
+              <a:rPr lang="vi-VN"/>
+            </a:br>
+            <a:r>
+              <a:rPr lang="vi-VN"/>
+              <a:t>&lt;td&gt;</a:t>
+            </a:r>
+            <a:br>
+              <a:rPr lang="vi-VN"/>
+            </a:br>
+            <a:r>
+              <a:rPr lang="vi-VN"/>
+              <a:t>	&lt;input type="text" name="username" value="" 	id="Register_username"/&gt;</a:t>
+            </a:r>
+            <a:br>
+              <a:rPr lang="vi-VN"/>
+            </a:br>
+            <a:r>
+              <a:rPr lang="vi-VN"/>
+              <a:t>&lt;/td&gt; </a:t>
+            </a:r>
+            <a:br>
+              <a:rPr lang="vi-VN"/>
+            </a:br>
+            <a:br>
+              <a:rPr lang="vi-VN"/>
+            </a:br>
+            <a:endParaRPr lang="vi-VN"/>
+          </a:p>
+        </p:txBody>
+      </p:sp>
+    </p:spTree>
+    <p:extLst>
+      <p:ext uri="{BB962C8B-B14F-4D97-AF65-F5344CB8AC3E}">
+        <p14:creationId xmlns:p14="http://schemas.microsoft.com/office/powerpoint/2010/main" val="3456834412"/>
+      </p:ext>
+    </p:extLst>
+  </p:cSld>
+  <p:clrMapOvr>
+    <a:masterClrMapping/>
+  </p:clrMapOvr>
+</p:sld>
+</file>
+
+<file path=ppt/slides/slide7.xml><?xml version="1.0" encoding="utf-8"?>
+<p:sld xmlns:a="http://schemas.openxmlformats.org/drawingml/2006/main" xmlns:r="http://schemas.openxmlformats.org/officeDocument/2006/relationships" xmlns:p="http://schemas.openxmlformats.org/presentationml/2006/main">
+  <p:cSld>
+    <p:spTree>
+      <p:nvGrpSpPr>
+        <p:cNvPr id="1" name=""/>
+        <p:cNvGrpSpPr/>
+        <p:nvPr/>
+      </p:nvGrpSpPr>
+      <p:grpSpPr>
+        <a:xfrm>
+          <a:off x="0" y="0"/>
+          <a:ext cx="0" cy="0"/>
+          <a:chOff x="0" y="0"/>
+          <a:chExt cx="0" cy="0"/>
+        </a:xfrm>
+      </p:grpSpPr>
+      <p:sp>
+        <p:nvSpPr>
+          <p:cNvPr id="2" name="Title 1"/>
+          <p:cNvSpPr>
+            <a:spLocks noGrp="1"/>
+          </p:cNvSpPr>
+          <p:nvPr>
+            <p:ph type="title"/>
+          </p:nvPr>
+        </p:nvSpPr>
+        <p:spPr/>
+        <p:txBody>
+          <a:bodyPr/>
+          <a:lstStyle/>
+          <a:p>
+            <a:r>
+              <a:rPr lang="en-US" b="1" i="1"/>
+              <a:t>Why we need UI component tags</a:t>
+            </a:r>
+            <a:r>
+              <a:rPr lang="en-US" sz="3600"/>
+              <a:t> </a:t>
+            </a:r>
+            <a:endParaRPr lang="vi-VN"/>
+          </a:p>
+        </p:txBody>
+      </p:sp>
+      <p:sp>
+        <p:nvSpPr>
+          <p:cNvPr id="3" name="Content Placeholder 2"/>
+          <p:cNvSpPr>
+            <a:spLocks noGrp="1"/>
+          </p:cNvSpPr>
+          <p:nvPr>
+            <p:ph idx="1"/>
+          </p:nvPr>
+        </p:nvSpPr>
+        <p:spPr/>
+        <p:txBody>
+          <a:bodyPr/>
+          <a:lstStyle/>
+          <a:p>
+            <a:r>
+              <a:rPr lang="en-US"/>
+              <a:t>The Struts 2 UI component tags were carefully designed as a mini-MVC UI component framework of their own.</a:t>
+            </a:r>
+          </a:p>
+          <a:p>
+            <a:r>
+              <a:rPr lang="en-US"/>
+              <a:t>FreeMarker template that can easily be edited.</a:t>
+            </a:r>
+          </a:p>
+          <a:p>
+            <a:r>
+              <a:rPr lang="en-US"/>
+              <a:t>Can tweak the Struts 2 UI components to generate HTML that meets your own idiosyncratic requirements.</a:t>
+            </a:r>
+            <a:endParaRPr lang="vi-VN"/>
+          </a:p>
+        </p:txBody>
+      </p:sp>
+    </p:spTree>
+    <p:extLst>
+      <p:ext uri="{BB962C8B-B14F-4D97-AF65-F5344CB8AC3E}">
+        <p14:creationId xmlns:p14="http://schemas.microsoft.com/office/powerpoint/2010/main" val="2459825743"/>
+      </p:ext>
+    </p:extLst>
+  </p:cSld>
+  <p:clrMapOvr>
+    <a:masterClrMapping/>
+  </p:clrMapOvr>
+</p:sld>
+</file>
+
+<file path=ppt/slides/slide8.xml><?xml version="1.0" encoding="utf-8"?>
+<p:sld xmlns:a="http://schemas.openxmlformats.org/drawingml/2006/main" xmlns:r="http://schemas.openxmlformats.org/officeDocument/2006/relationships" xmlns:p="http://schemas.openxmlformats.org/presentationml/2006/main">
+  <p:cSld>
+    <p:spTree>
+      <p:nvGrpSpPr>
+        <p:cNvPr id="1" name=""/>
+        <p:cNvGrpSpPr/>
+        <p:nvPr/>
+      </p:nvGrpSpPr>
+      <p:grpSpPr>
+        <a:xfrm>
+          <a:off x="0" y="0"/>
+          <a:ext cx="0" cy="0"/>
+          <a:chOff x="0" y="0"/>
+          <a:chExt cx="0" cy="0"/>
+        </a:xfrm>
+      </p:grpSpPr>
+      <p:sp>
+        <p:nvSpPr>
+          <p:cNvPr id="2" name="Title 1"/>
+          <p:cNvSpPr>
+            <a:spLocks noGrp="1"/>
+          </p:cNvSpPr>
+          <p:nvPr>
+            <p:ph type="title"/>
+          </p:nvPr>
+        </p:nvSpPr>
+        <p:spPr>
+          <a:xfrm>
+            <a:off x="838200" y="365125"/>
+            <a:ext cx="10515600" cy="1325563"/>
+          </a:xfrm>
+        </p:spPr>
+        <p:txBody>
+          <a:bodyPr/>
+          <a:lstStyle/>
+          <a:p>
+            <a:r>
+              <a:rPr lang="en-US" b="1" i="1"/>
+              <a:t>Why we need UI component tags</a:t>
+            </a:r>
+            <a:r>
+              <a:rPr lang="en-US" sz="3600"/>
+              <a:t> </a:t>
+            </a:r>
+            <a:endParaRPr lang="vi-VN"/>
+          </a:p>
+        </p:txBody>
+      </p:sp>
+      <p:pic>
+        <p:nvPicPr>
+          <p:cNvPr id="6" name="Content Placeholder 5"/>
+          <p:cNvPicPr>
+            <a:picLocks noGrp="1" noChangeAspect="1"/>
+          </p:cNvPicPr>
+          <p:nvPr>
+            <p:ph idx="1"/>
+          </p:nvPr>
+        </p:nvPicPr>
+        <p:blipFill>
+          <a:blip r:embed="rId2">
+            <a:extLst>
+              <a:ext uri="{28A0092B-C50C-407E-A947-70E740481C1C}">
+                <a14:useLocalDpi xmlns:a14="http://schemas.microsoft.com/office/drawing/2010/main" val="0"/>
+              </a:ext>
+            </a:extLst>
+          </a:blip>
+          <a:stretch>
+            <a:fillRect/>
+          </a:stretch>
+        </p:blipFill>
+        <p:spPr>
+          <a:xfrm>
+            <a:off x="6683330" y="1787856"/>
+            <a:ext cx="4670470" cy="1856096"/>
+          </a:xfrm>
+        </p:spPr>
+      </p:pic>
+      <p:sp>
+        <p:nvSpPr>
+          <p:cNvPr id="7" name="TextBox 6"/>
+          <p:cNvSpPr txBox="1"/>
+          <p:nvPr/>
+        </p:nvSpPr>
+        <p:spPr>
+          <a:xfrm>
+            <a:off x="909851" y="2720622"/>
+            <a:ext cx="5186149" cy="923330"/>
+          </a:xfrm>
+          <a:prstGeom prst="rect">
+            <a:avLst/>
+          </a:prstGeom>
+          <a:noFill/>
+        </p:spPr>
+        <p:txBody>
+          <a:bodyPr wrap="square" rtlCol="0">
+            <a:spAutoFit/>
+          </a:bodyPr>
+          <a:lstStyle/>
+          <a:p>
+            <a:r>
+              <a:rPr lang="en-US"/>
+              <a:t>The account form is prepopulated</a:t>
+            </a:r>
+            <a:br>
+              <a:rPr lang="en-US"/>
+            </a:br>
+            <a:r>
+              <a:rPr lang="en-US"/>
+              <a:t>with data from properties on the </a:t>
+            </a:r>
+            <a:r>
+              <a:rPr lang="en-US" b="1"/>
+              <a:t>ValueStack</a:t>
+            </a:r>
+            <a:r>
+              <a:rPr lang="en-US"/>
+              <a:t> </a:t>
+            </a:r>
+            <a:br>
+              <a:rPr lang="en-US"/>
+            </a:br>
+            <a:endParaRPr lang="vi-VN"/>
+          </a:p>
+        </p:txBody>
+      </p:sp>
+      <p:sp>
+        <p:nvSpPr>
+          <p:cNvPr id="9" name="TextBox 8"/>
+          <p:cNvSpPr txBox="1"/>
+          <p:nvPr/>
+        </p:nvSpPr>
+        <p:spPr>
+          <a:xfrm>
+            <a:off x="838201" y="1514901"/>
+            <a:ext cx="4579962" cy="1231106"/>
+          </a:xfrm>
+          <a:prstGeom prst="rect">
+            <a:avLst/>
+          </a:prstGeom>
+          <a:noFill/>
+        </p:spPr>
+        <p:txBody>
+          <a:bodyPr wrap="square" rtlCol="0">
+            <a:spAutoFit/>
+          </a:bodyPr>
+          <a:lstStyle/>
+          <a:p>
+            <a:pPr lvl="2"/>
+            <a:endParaRPr lang="vi-VN" sz="3800"/>
+          </a:p>
+          <a:p>
+            <a:pPr lvl="2"/>
+            <a:r>
+              <a:rPr lang="en-US"/>
+              <a:t>BINDING FORM FIELDS TO VALUESTACK PROPERTIES</a:t>
+            </a:r>
+          </a:p>
+        </p:txBody>
+      </p:sp>
+      <p:cxnSp>
+        <p:nvCxnSpPr>
+          <p:cNvPr id="16" name="Connector: Curved 15"/>
+          <p:cNvCxnSpPr/>
+          <p:nvPr/>
+        </p:nvCxnSpPr>
+        <p:spPr>
+          <a:xfrm rot="16200000" flipH="1">
+            <a:off x="1317009" y="1467135"/>
+            <a:ext cx="914400" cy="545910"/>
+          </a:xfrm>
+          <a:prstGeom prst="curvedConnector3">
+            <a:avLst/>
+          </a:prstGeom>
+          <a:ln>
+            <a:tailEnd type="triangle"/>
+          </a:ln>
+        </p:spPr>
+        <p:style>
+          <a:lnRef idx="1">
+            <a:schemeClr val="accent1"/>
+          </a:lnRef>
+          <a:fillRef idx="0">
+            <a:schemeClr val="accent1"/>
+          </a:fillRef>
+          <a:effectRef idx="0">
+            <a:schemeClr val="accent1"/>
+          </a:effectRef>
+          <a:fontRef idx="minor">
+            <a:schemeClr val="tx1"/>
+          </a:fontRef>
+        </p:style>
+      </p:cxnSp>
+    </p:spTree>
+    <p:extLst>
+      <p:ext uri="{BB962C8B-B14F-4D97-AF65-F5344CB8AC3E}">
+        <p14:creationId xmlns:p14="http://schemas.microsoft.com/office/powerpoint/2010/main" val="2017913582"/>
+      </p:ext>
+    </p:extLst>
+  </p:cSld>
+  <p:clrMapOvr>
+    <a:masterClrMapping/>
+  </p:clrMapOvr>
+</p:sld>
+</file>
+
+<file path=ppt/slides/slide9.xml><?xml version="1.0" encoding="utf-8"?>
+<p:sld xmlns:a="http://schemas.openxmlformats.org/drawingml/2006/main" xmlns:r="http://schemas.openxmlformats.org/officeDocument/2006/relationships" xmlns:p="http://schemas.openxmlformats.org/presentationml/2006/main">
+  <p:cSld>
+    <p:spTree>
+      <p:nvGrpSpPr>
+        <p:cNvPr id="1" name=""/>
+        <p:cNvGrpSpPr/>
+        <p:nvPr/>
+      </p:nvGrpSpPr>
+      <p:grpSpPr>
+        <a:xfrm>
+          <a:off x="0" y="0"/>
+          <a:ext cx="0" cy="0"/>
+          <a:chOff x="0" y="0"/>
+          <a:chExt cx="0" cy="0"/>
+        </a:xfrm>
+      </p:grpSpPr>
+      <p:sp>
+        <p:nvSpPr>
+          <p:cNvPr id="2" name="Title 1"/>
+          <p:cNvSpPr>
+            <a:spLocks noGrp="1"/>
+          </p:cNvSpPr>
+          <p:nvPr>
+            <p:ph type="title"/>
+          </p:nvPr>
+        </p:nvSpPr>
+        <p:spPr/>
+        <p:txBody>
+          <a:bodyPr/>
+          <a:lstStyle/>
+          <a:p>
+            <a:r>
+              <a:rPr lang="en-US" b="1" i="1"/>
+              <a:t>Why we need UI component tags</a:t>
+            </a:r>
+            <a:r>
+              <a:rPr lang="en-US" sz="3600"/>
+              <a:t> </a:t>
+            </a:r>
+            <a:endParaRPr lang="vi-VN"/>
+          </a:p>
+        </p:txBody>
+      </p:sp>
+      <p:sp>
+        <p:nvSpPr>
+          <p:cNvPr id="3" name="Content Placeholder 2"/>
+          <p:cNvSpPr>
+            <a:spLocks noGrp="1"/>
+          </p:cNvSpPr>
+          <p:nvPr>
+            <p:ph idx="1"/>
+          </p:nvPr>
+        </p:nvSpPr>
+        <p:spPr/>
+        <p:txBody>
+          <a:bodyPr/>
+          <a:lstStyle/>
+          <a:p>
+            <a:r>
+              <a:rPr lang="en-US"/>
+              <a:t>This binding lays the foundation for a bidirectional flow of data between UI components and the domain model objects on the ValueStack </a:t>
+            </a:r>
+            <a:br>
+              <a:rPr lang="en-US"/>
+            </a:br>
+            <a:endParaRPr lang="vi-VN"/>
+          </a:p>
+        </p:txBody>
+      </p:sp>
+      <p:pic>
+        <p:nvPicPr>
+          <p:cNvPr id="5" name="Picture 4"/>
+          <p:cNvPicPr>
+            <a:picLocks noChangeAspect="1"/>
+          </p:cNvPicPr>
+          <p:nvPr/>
+        </p:nvPicPr>
+        <p:blipFill>
+          <a:blip r:embed="rId2">
+            <a:extLst>
+              <a:ext uri="{28A0092B-C50C-407E-A947-70E740481C1C}">
+                <a14:useLocalDpi xmlns:a14="http://schemas.microsoft.com/office/drawing/2010/main" val="0"/>
+              </a:ext>
+            </a:extLst>
+          </a:blip>
+          <a:stretch>
+            <a:fillRect/>
+          </a:stretch>
+        </p:blipFill>
+        <p:spPr>
+          <a:xfrm>
+            <a:off x="937648" y="3223116"/>
+            <a:ext cx="5995415" cy="2953848"/>
+          </a:xfrm>
+          <a:prstGeom prst="rect">
+            <a:avLst/>
+          </a:prstGeom>
+        </p:spPr>
+      </p:pic>
+      <p:sp>
+        <p:nvSpPr>
+          <p:cNvPr id="6" name="TextBox 5"/>
+          <p:cNvSpPr txBox="1"/>
+          <p:nvPr/>
+        </p:nvSpPr>
+        <p:spPr>
+          <a:xfrm>
+            <a:off x="7997588" y="3534770"/>
+            <a:ext cx="3356212" cy="923330"/>
+          </a:xfrm>
+          <a:prstGeom prst="rect">
+            <a:avLst/>
+          </a:prstGeom>
+          <a:noFill/>
+        </p:spPr>
+        <p:txBody>
+          <a:bodyPr wrap="square" rtlCol="0">
+            <a:spAutoFit/>
+          </a:bodyPr>
+          <a:lstStyle/>
+          <a:p>
+            <a:r>
+              <a:rPr lang="en-US"/>
+              <a:t>we’ll expose our User object as a</a:t>
+            </a:r>
+          </a:p>
+          <a:p>
+            <a:r>
+              <a:rPr lang="en-US"/>
+              <a:t>domain model object rather than as a local JavaBeans property</a:t>
+            </a:r>
+            <a:endParaRPr lang="vi-VN"/>
+          </a:p>
+        </p:txBody>
+      </p:sp>
+    </p:spTree>
+    <p:extLst>
+      <p:ext uri="{BB962C8B-B14F-4D97-AF65-F5344CB8AC3E}">
+        <p14:creationId xmlns:p14="http://schemas.microsoft.com/office/powerpoint/2010/main" val="2968515983"/>
       </p:ext>
     </p:extLst>
   </p:cSld>

</xml_diff>